<commit_message>
Remove browser panel in diagram
</commit_message>
<xml_diff>
--- a/docs/diagrams/UiComponentClassDiagram.pptx
+++ b/docs/diagrams/UiComponentClassDiagram.pptx
@@ -3444,14 +3444,20 @@
       </p:grpSpPr>
       <p:sp>
         <p:nvSpPr>
-          <p:cNvPr id="23" name="Rectangle 65"/>
+          <p:cNvPr id="104" name="Rectangle 65">
+            <a:extLst>
+              <a:ext uri="{FF2B5EF4-FFF2-40B4-BE49-F238E27FC236}">
+                <a16:creationId xmlns:a16="http://schemas.microsoft.com/office/drawing/2014/main" id="{6F6B9242-07FF-44E4-89F9-3B647CFB53F9}"/>
+              </a:ext>
+            </a:extLst>
+          </p:cNvPr>
           <p:cNvSpPr/>
           <p:nvPr/>
         </p:nvSpPr>
         <p:spPr>
           <a:xfrm>
-            <a:off x="1371600" y="457201"/>
-            <a:ext cx="4917083" cy="5181600"/>
+            <a:off x="1368217" y="546243"/>
+            <a:ext cx="4876800" cy="5105399"/>
           </a:xfrm>
           <a:prstGeom prst="roundRect">
             <a:avLst>
@@ -3459,7 +3465,7 @@
             </a:avLst>
           </a:prstGeom>
           <a:solidFill>
-            <a:srgbClr val="F1F5E9"/>
+            <a:srgbClr val="F1F5E7"/>
           </a:solidFill>
           <a:ln w="19050">
             <a:noFill/>
@@ -3512,7 +3518,7 @@
         </p:nvSpPr>
         <p:spPr>
           <a:xfrm>
-            <a:off x="2250083" y="1350622"/>
+            <a:off x="2233041" y="1503021"/>
             <a:ext cx="1093635" cy="346760"/>
           </a:xfrm>
           <a:prstGeom prst="rect">
@@ -3572,7 +3578,7 @@
         </p:nvSpPr>
         <p:spPr>
           <a:xfrm>
-            <a:off x="2746663" y="1981202"/>
+            <a:off x="2729621" y="2133601"/>
             <a:ext cx="1093635" cy="236841"/>
           </a:xfrm>
           <a:prstGeom prst="rect">
@@ -3632,7 +3638,7 @@
         </p:nvSpPr>
         <p:spPr>
           <a:xfrm>
-            <a:off x="2246977" y="780326"/>
+            <a:off x="2229935" y="932725"/>
             <a:ext cx="1093635" cy="346760"/>
           </a:xfrm>
           <a:prstGeom prst="rect">
@@ -3694,7 +3700,7 @@
         </p:nvCxnSpPr>
         <p:spPr>
           <a:xfrm rot="16200000" flipH="1">
-            <a:off x="2683580" y="1237301"/>
+            <a:off x="2666538" y="1389700"/>
             <a:ext cx="223536" cy="3106"/>
           </a:xfrm>
           <a:prstGeom prst="bentConnector3">
@@ -3734,7 +3740,7 @@
         </p:nvSpPr>
         <p:spPr>
           <a:xfrm rot="10800000" flipV="1">
-            <a:off x="5548852" y="1119879"/>
+            <a:off x="5531810" y="1272278"/>
             <a:ext cx="270504" cy="175523"/>
           </a:xfrm>
           <a:prstGeom prst="triangle">
@@ -3782,7 +3788,7 @@
         </p:nvCxnSpPr>
         <p:spPr>
           <a:xfrm flipV="1">
-            <a:off x="798870" y="2001339"/>
+            <a:off x="781828" y="2153738"/>
             <a:ext cx="684904" cy="1"/>
           </a:xfrm>
           <a:prstGeom prst="bentConnector3">
@@ -3825,7 +3831,7 @@
         </p:nvSpPr>
         <p:spPr>
           <a:xfrm rot="16200000">
-            <a:off x="5857964" y="1474279"/>
+            <a:off x="5840922" y="1626678"/>
             <a:ext cx="2362201" cy="328045"/>
           </a:xfrm>
           <a:prstGeom prst="roundRect">
@@ -3879,13 +3885,13 @@
       </p:sp>
       <p:sp>
         <p:nvSpPr>
-          <p:cNvPr id="34" name="Rectangle 11"/>
+          <p:cNvPr id="35" name="Rectangle 11"/>
           <p:cNvSpPr/>
           <p:nvPr/>
         </p:nvSpPr>
         <p:spPr>
           <a:xfrm>
-            <a:off x="2746663" y="2658761"/>
+            <a:off x="2729619" y="4826287"/>
             <a:ext cx="1093635" cy="236841"/>
           </a:xfrm>
           <a:prstGeom prst="rect">
@@ -3925,7 +3931,7 @@
                   </a:schemeClr>
                 </a:solidFill>
               </a:rPr>
-              <a:t>BrowserPanel</a:t>
+              <a:t>StatusBarFooter</a:t>
             </a:r>
             <a:endParaRPr lang="en-SG" sz="1050" b="1" dirty="0">
               <a:solidFill>
@@ -3939,13 +3945,13 @@
       </p:sp>
       <p:sp>
         <p:nvSpPr>
-          <p:cNvPr id="35" name="Rectangle 11"/>
+          <p:cNvPr id="36" name="Rectangle 11"/>
           <p:cNvSpPr/>
           <p:nvPr/>
         </p:nvSpPr>
         <p:spPr>
           <a:xfrm>
-            <a:off x="2746661" y="4898692"/>
+            <a:off x="2731014" y="2829914"/>
             <a:ext cx="1093635" cy="236841"/>
           </a:xfrm>
           <a:prstGeom prst="rect">
@@ -3985,7 +3991,7 @@
                   </a:schemeClr>
                 </a:solidFill>
               </a:rPr>
-              <a:t>StatusBarFooter</a:t>
+              <a:t>ClientListPanel</a:t>
             </a:r>
             <a:endParaRPr lang="en-SG" sz="1050" b="1" dirty="0">
               <a:solidFill>
@@ -3999,14 +4005,14 @@
       </p:sp>
       <p:sp>
         <p:nvSpPr>
-          <p:cNvPr id="36" name="Rectangle 11"/>
+          <p:cNvPr id="37" name="Rectangle 11"/>
           <p:cNvSpPr/>
           <p:nvPr/>
         </p:nvSpPr>
         <p:spPr>
           <a:xfrm>
-            <a:off x="2746661" y="3001362"/>
-            <a:ext cx="1093635" cy="236841"/>
+            <a:off x="4509198" y="3066755"/>
+            <a:ext cx="1040906" cy="236841"/>
           </a:xfrm>
           <a:prstGeom prst="rect">
             <a:avLst/>
@@ -4045,7 +4051,7 @@
                   </a:schemeClr>
                 </a:solidFill>
               </a:rPr>
-              <a:t>ClientListPanel</a:t>
+              <a:t>ClientCard</a:t>
             </a:r>
             <a:endParaRPr lang="en-SG" sz="1050" b="1" dirty="0">
               <a:solidFill>
@@ -4059,14 +4065,14 @@
       </p:sp>
       <p:sp>
         <p:nvSpPr>
-          <p:cNvPr id="37" name="Rectangle 11"/>
+          <p:cNvPr id="38" name="Rectangle 11"/>
           <p:cNvSpPr/>
           <p:nvPr/>
         </p:nvSpPr>
         <p:spPr>
           <a:xfrm>
-            <a:off x="4524845" y="3238203"/>
-            <a:ext cx="1040906" cy="236841"/>
+            <a:off x="2729620" y="5228528"/>
+            <a:ext cx="1093635" cy="236841"/>
           </a:xfrm>
           <a:prstGeom prst="rect">
             <a:avLst/>
@@ -4105,7 +4111,7 @@
                   </a:schemeClr>
                 </a:solidFill>
               </a:rPr>
-              <a:t>ClientCard</a:t>
+              <a:t>HelpWindow</a:t>
             </a:r>
             <a:endParaRPr lang="en-SG" sz="1050" b="1" dirty="0">
               <a:solidFill>
@@ -4119,73 +4125,13 @@
       </p:sp>
       <p:sp>
         <p:nvSpPr>
-          <p:cNvPr id="38" name="Rectangle 11"/>
-          <p:cNvSpPr/>
-          <p:nvPr/>
-        </p:nvSpPr>
-        <p:spPr>
-          <a:xfrm>
-            <a:off x="2746662" y="5300933"/>
-            <a:ext cx="1093635" cy="236841"/>
-          </a:xfrm>
-          <a:prstGeom prst="rect">
-            <a:avLst/>
-          </a:prstGeom>
-          <a:ln w="19050">
-            <a:solidFill>
-              <a:schemeClr val="accent3"/>
-            </a:solidFill>
-          </a:ln>
-          <a:effectLst/>
-        </p:spPr>
-        <p:style>
-          <a:lnRef idx="1">
-            <a:schemeClr val="accent3"/>
-          </a:lnRef>
-          <a:fillRef idx="2">
-            <a:schemeClr val="accent3"/>
-          </a:fillRef>
-          <a:effectRef idx="1">
-            <a:schemeClr val="accent3"/>
-          </a:effectRef>
-          <a:fontRef idx="minor">
-            <a:schemeClr val="dk1"/>
-          </a:fontRef>
-        </p:style>
-        <p:txBody>
-          <a:bodyPr rtlCol="0" anchor="ctr"/>
-          <a:lstStyle/>
-          <a:p>
-            <a:pPr algn="ctr"/>
-            <a:r>
-              <a:rPr lang="en-US" sz="1050" b="1" dirty="0" err="1">
-                <a:solidFill>
-                  <a:schemeClr val="accent3">
-                    <a:lumMod val="75000"/>
-                  </a:schemeClr>
-                </a:solidFill>
-              </a:rPr>
-              <a:t>HelpWindow</a:t>
-            </a:r>
-            <a:endParaRPr lang="en-SG" sz="1050" b="1" dirty="0">
-              <a:solidFill>
-                <a:schemeClr val="accent3">
-                  <a:lumMod val="75000"/>
-                </a:schemeClr>
-              </a:solidFill>
-            </a:endParaRPr>
-          </a:p>
-        </p:txBody>
-      </p:sp>
-      <p:sp>
-        <p:nvSpPr>
           <p:cNvPr id="39" name="Flowchart: Decision 38"/>
           <p:cNvSpPr/>
           <p:nvPr/>
         </p:nvSpPr>
         <p:spPr>
           <a:xfrm>
-            <a:off x="2478683" y="1715854"/>
+            <a:off x="2461641" y="1868253"/>
             <a:ext cx="183156" cy="161573"/>
           </a:xfrm>
           <a:prstGeom prst="flowChartDecision">
@@ -4236,7 +4182,7 @@
         </p:nvCxnSpPr>
         <p:spPr>
           <a:xfrm rot="16200000" flipH="1">
-            <a:off x="2547364" y="1900324"/>
+            <a:off x="2530322" y="2052723"/>
             <a:ext cx="222196" cy="176402"/>
           </a:xfrm>
           <a:prstGeom prst="bentConnector2">
@@ -4274,7 +4220,7 @@
         </p:nvSpPr>
         <p:spPr>
           <a:xfrm>
-            <a:off x="2744934" y="2313710"/>
+            <a:off x="2727892" y="2466109"/>
             <a:ext cx="1095361" cy="236841"/>
           </a:xfrm>
           <a:prstGeom prst="rect">
@@ -4328,58 +4274,17 @@
       </p:sp>
       <p:cxnSp>
         <p:nvCxnSpPr>
-          <p:cNvPr id="44" name="Elbow Connector 63"/>
-          <p:cNvCxnSpPr>
-            <a:stCxn id="39" idx="2"/>
-            <a:endCxn id="34" idx="1"/>
-          </p:cNvCxnSpPr>
-          <p:nvPr/>
-        </p:nvCxnSpPr>
-        <p:spPr>
-          <a:xfrm rot="16200000" flipH="1">
-            <a:off x="2208585" y="2239103"/>
-            <a:ext cx="899755" cy="176402"/>
-          </a:xfrm>
-          <a:prstGeom prst="bentConnector2">
-            <a:avLst/>
-          </a:prstGeom>
-          <a:ln w="19050">
-            <a:solidFill>
-              <a:schemeClr val="accent3"/>
-            </a:solidFill>
-            <a:headEnd type="none" w="med" len="med"/>
-            <a:tailEnd type="arrow" w="med" len="med"/>
-          </a:ln>
-          <a:effectLst/>
-        </p:spPr>
-        <p:style>
-          <a:lnRef idx="1">
-            <a:schemeClr val="accent2"/>
-          </a:lnRef>
-          <a:fillRef idx="2">
-            <a:schemeClr val="accent2"/>
-          </a:fillRef>
-          <a:effectRef idx="1">
-            <a:schemeClr val="accent2"/>
-          </a:effectRef>
-          <a:fontRef idx="minor">
-            <a:schemeClr val="dk1"/>
-          </a:fontRef>
-        </p:style>
-      </p:cxnSp>
-      <p:cxnSp>
-        <p:nvCxnSpPr>
           <p:cNvPr id="47" name="Elbow Connector 63"/>
           <p:cNvCxnSpPr>
-            <a:stCxn id="39" idx="2"/>
+            <a:cxnSpLocks/>
             <a:endCxn id="36" idx="1"/>
           </p:cNvCxnSpPr>
           <p:nvPr/>
         </p:nvCxnSpPr>
         <p:spPr>
           <a:xfrm rot="16200000" flipH="1">
-            <a:off x="2037283" y="2410405"/>
-            <a:ext cx="1242356" cy="176400"/>
+            <a:off x="2097932" y="2315252"/>
+            <a:ext cx="1091749" cy="174416"/>
           </a:xfrm>
           <a:prstGeom prst="bentConnector2">
             <a:avLst/>
@@ -4419,8 +4324,8 @@
         </p:nvCxnSpPr>
         <p:spPr>
           <a:xfrm rot="16200000" flipH="1">
-            <a:off x="1088618" y="3359070"/>
-            <a:ext cx="3139686" cy="176400"/>
+            <a:off x="1183978" y="3399067"/>
+            <a:ext cx="2914882" cy="176400"/>
           </a:xfrm>
           <a:prstGeom prst="bentConnector2">
             <a:avLst/>
@@ -4460,8 +4365,8 @@
         </p:nvCxnSpPr>
         <p:spPr>
           <a:xfrm rot="16200000" flipH="1">
-            <a:off x="673370" y="3346062"/>
-            <a:ext cx="3727034" cy="419549"/>
+            <a:off x="786553" y="3403882"/>
+            <a:ext cx="3478694" cy="407439"/>
           </a:xfrm>
           <a:prstGeom prst="bentConnector2">
             <a:avLst/>
@@ -4498,7 +4403,7 @@
         </p:nvSpPr>
         <p:spPr>
           <a:xfrm>
-            <a:off x="5298083" y="780326"/>
+            <a:off x="5281041" y="932725"/>
             <a:ext cx="772043" cy="346760"/>
           </a:xfrm>
           <a:prstGeom prst="rect">
@@ -4580,7 +4485,7 @@
         </p:nvCxnSpPr>
         <p:spPr>
           <a:xfrm flipV="1">
-            <a:off x="3840295" y="1295402"/>
+            <a:off x="3823253" y="1447801"/>
             <a:ext cx="1843809" cy="1136729"/>
           </a:xfrm>
           <a:prstGeom prst="bentConnector2">
@@ -4621,49 +4526,8 @@
         </p:nvCxnSpPr>
         <p:spPr>
           <a:xfrm rot="5400000">
-            <a:off x="4594317" y="2266837"/>
-            <a:ext cx="2061222" cy="118353"/>
-          </a:xfrm>
-          <a:prstGeom prst="bentConnector2">
-            <a:avLst/>
-          </a:prstGeom>
-          <a:ln w="6350">
-            <a:solidFill>
-              <a:schemeClr val="accent3"/>
-            </a:solidFill>
-            <a:headEnd type="none" w="med" len="med"/>
-            <a:tailEnd type="none" w="med" len="med"/>
-          </a:ln>
-          <a:effectLst/>
-        </p:spPr>
-        <p:style>
-          <a:lnRef idx="1">
-            <a:schemeClr val="accent2"/>
-          </a:lnRef>
-          <a:fillRef idx="2">
-            <a:schemeClr val="accent2"/>
-          </a:fillRef>
-          <a:effectRef idx="1">
-            <a:schemeClr val="accent2"/>
-          </a:effectRef>
-          <a:fontRef idx="minor">
-            <a:schemeClr val="dk1"/>
-          </a:fontRef>
-        </p:style>
-      </p:cxnSp>
-      <p:cxnSp>
-        <p:nvCxnSpPr>
-          <p:cNvPr id="82" name="Elbow Connector 63"/>
-          <p:cNvCxnSpPr>
-            <a:stCxn id="16" idx="3"/>
-            <a:endCxn id="34" idx="3"/>
-          </p:cNvCxnSpPr>
-          <p:nvPr/>
-        </p:nvCxnSpPr>
-        <p:spPr>
-          <a:xfrm rot="5400000">
-            <a:off x="4021311" y="1114389"/>
-            <a:ext cx="1481780" cy="1843806"/>
+            <a:off x="4739896" y="2258009"/>
+            <a:ext cx="1737375" cy="116958"/>
           </a:xfrm>
           <a:prstGeom prst="bentConnector2">
             <a:avLst/>
@@ -4703,7 +4567,7 @@
         </p:nvCxnSpPr>
         <p:spPr>
           <a:xfrm flipV="1">
-            <a:off x="3343718" y="1295402"/>
+            <a:off x="3326676" y="1447801"/>
             <a:ext cx="2340386" cy="228600"/>
           </a:xfrm>
           <a:prstGeom prst="bentConnector2">
@@ -4744,7 +4608,7 @@
         </p:nvCxnSpPr>
         <p:spPr>
           <a:xfrm rot="5400000">
-            <a:off x="3564110" y="2897120"/>
+            <a:off x="3547068" y="2824715"/>
             <a:ext cx="2396180" cy="1843807"/>
           </a:xfrm>
           <a:prstGeom prst="bentConnector2">
@@ -4785,8 +4649,8 @@
         </p:nvCxnSpPr>
         <p:spPr>
           <a:xfrm rot="5400000">
-            <a:off x="2700225" y="2435475"/>
-            <a:ext cx="4123952" cy="1843807"/>
+            <a:off x="2795585" y="2475472"/>
+            <a:ext cx="3899148" cy="1843807"/>
           </a:xfrm>
           <a:prstGeom prst="bentConnector2">
             <a:avLst/>
@@ -4825,7 +4689,7 @@
         </p:nvCxnSpPr>
         <p:spPr>
           <a:xfrm rot="5400000" flipH="1" flipV="1">
-            <a:off x="4749056" y="-1345659"/>
+            <a:off x="4732014" y="-1193260"/>
             <a:ext cx="170724" cy="4081246"/>
           </a:xfrm>
           <a:prstGeom prst="bentConnector2">
@@ -4864,7 +4728,7 @@
         </p:nvSpPr>
         <p:spPr>
           <a:xfrm rot="16200000">
-            <a:off x="6360273" y="3929938"/>
+            <a:off x="6350819" y="3768384"/>
             <a:ext cx="1371599" cy="328045"/>
           </a:xfrm>
           <a:prstGeom prst="roundRect">
@@ -4924,7 +4788,7 @@
         </p:nvSpPr>
         <p:spPr>
           <a:xfrm rot="16200000">
-            <a:off x="1110337" y="1870604"/>
+            <a:off x="1093295" y="2023003"/>
             <a:ext cx="1093635" cy="346760"/>
           </a:xfrm>
           <a:prstGeom prst="rect">
@@ -4994,7 +4858,7 @@
         </p:nvSpPr>
         <p:spPr>
           <a:xfrm flipV="1">
-            <a:off x="1521902" y="1295403"/>
+            <a:off x="1504860" y="1447802"/>
             <a:ext cx="270504" cy="175523"/>
           </a:xfrm>
           <a:prstGeom prst="triangle">
@@ -5045,7 +4909,7 @@
         </p:nvCxnSpPr>
         <p:spPr>
           <a:xfrm rot="10800000" flipV="1">
-            <a:off x="1657155" y="953705"/>
+            <a:off x="1640113" y="1106104"/>
             <a:ext cx="589823" cy="341697"/>
           </a:xfrm>
           <a:prstGeom prst="bentConnector2">
@@ -5087,7 +4951,7 @@
         </p:nvCxnSpPr>
         <p:spPr>
           <a:xfrm rot="16200000" flipH="1">
-            <a:off x="2380245" y="2067442"/>
+            <a:off x="2363203" y="2219841"/>
             <a:ext cx="554704" cy="174673"/>
           </a:xfrm>
           <a:prstGeom prst="bentConnector2">
@@ -5128,7 +4992,7 @@
         </p:nvCxnSpPr>
         <p:spPr>
           <a:xfrm rot="5400000">
-            <a:off x="4360091" y="775609"/>
+            <a:off x="4343049" y="928008"/>
             <a:ext cx="804221" cy="1843806"/>
           </a:xfrm>
           <a:prstGeom prst="bentConnector2">
@@ -5162,6 +5026,7 @@
         <p:nvCxnSpPr>
           <p:cNvPr id="137" name="Elbow Connector 136"/>
           <p:cNvCxnSpPr>
+            <a:cxnSpLocks/>
             <a:stCxn id="36" idx="2"/>
             <a:endCxn id="37" idx="1"/>
           </p:cNvCxnSpPr>
@@ -5169,7 +5034,7 @@
         </p:nvCxnSpPr>
         <p:spPr>
           <a:xfrm rot="16200000" flipH="1">
-            <a:off x="3849952" y="2681730"/>
+            <a:off x="3834305" y="2510282"/>
             <a:ext cx="118421" cy="1231366"/>
           </a:xfrm>
           <a:prstGeom prst="bentConnector2">
@@ -5210,8 +5075,8 @@
         </p:nvCxnSpPr>
         <p:spPr>
           <a:xfrm rot="5400000">
-            <a:off x="3850010" y="1285688"/>
-            <a:ext cx="1824381" cy="1843808"/>
+            <a:off x="3995589" y="1276862"/>
+            <a:ext cx="1500534" cy="1842413"/>
           </a:xfrm>
           <a:prstGeom prst="bentConnector2">
             <a:avLst/>
@@ -5248,7 +5113,7 @@
         </p:nvSpPr>
         <p:spPr>
           <a:xfrm>
-            <a:off x="5590031" y="1752602"/>
+            <a:off x="5572989" y="1905001"/>
             <a:ext cx="229325" cy="166560"/>
           </a:xfrm>
           <a:prstGeom prst="rect">
@@ -5301,7 +5166,7 @@
         </p:nvSpPr>
         <p:spPr>
           <a:xfrm>
-            <a:off x="3841650" y="1838204"/>
+            <a:off x="3824608" y="1990603"/>
             <a:ext cx="3048000" cy="203200"/>
           </a:xfrm>
           <a:custGeom>
@@ -5383,7 +5248,7 @@
         </p:nvSpPr>
         <p:spPr>
           <a:xfrm>
-            <a:off x="5585708" y="3497540"/>
+            <a:off x="5570061" y="3326092"/>
             <a:ext cx="229325" cy="160062"/>
           </a:xfrm>
           <a:prstGeom prst="rect">
@@ -5436,8 +5301,8 @@
         </p:nvSpPr>
         <p:spPr>
           <a:xfrm flipV="1">
-            <a:off x="4573735" y="3490009"/>
-            <a:ext cx="2337394" cy="93700"/>
+            <a:off x="4558088" y="3318561"/>
+            <a:ext cx="2315915" cy="93700"/>
           </a:xfrm>
           <a:custGeom>
             <a:avLst/>
@@ -5524,7 +5389,7 @@
         </p:nvSpPr>
         <p:spPr>
           <a:xfrm>
-            <a:off x="2746673" y="3398018"/>
+            <a:off x="2731026" y="3226570"/>
             <a:ext cx="1093635" cy="236841"/>
           </a:xfrm>
           <a:prstGeom prst="rect">
@@ -5590,7 +5455,7 @@
         </p:nvSpPr>
         <p:spPr>
           <a:xfrm>
-            <a:off x="4524845" y="3634858"/>
+            <a:off x="4509198" y="3463410"/>
             <a:ext cx="1040906" cy="236841"/>
           </a:xfrm>
           <a:prstGeom prst="rect">
@@ -5652,6 +5517,7 @@
             </a:extLst>
           </p:cNvPr>
           <p:cNvCxnSpPr>
+            <a:cxnSpLocks/>
             <a:stCxn id="48" idx="2"/>
             <a:endCxn id="49" idx="1"/>
           </p:cNvCxnSpPr>
@@ -5659,7 +5525,7 @@
         </p:nvCxnSpPr>
         <p:spPr>
           <a:xfrm rot="16200000" flipH="1">
-            <a:off x="3849958" y="3078392"/>
+            <a:off x="3834311" y="2906944"/>
             <a:ext cx="118420" cy="1231354"/>
           </a:xfrm>
           <a:prstGeom prst="bentConnector2">
@@ -5703,7 +5569,7 @@
         </p:nvSpPr>
         <p:spPr>
           <a:xfrm>
-            <a:off x="2744934" y="3789019"/>
+            <a:off x="2729287" y="3617571"/>
             <a:ext cx="1524000" cy="236841"/>
           </a:xfrm>
           <a:prstGeom prst="rect">
@@ -5769,7 +5635,7 @@
         </p:nvSpPr>
         <p:spPr>
           <a:xfrm>
-            <a:off x="4297947" y="4025859"/>
+            <a:off x="4282300" y="3854411"/>
             <a:ext cx="1267804" cy="236841"/>
           </a:xfrm>
           <a:prstGeom prst="rect">
@@ -5839,7 +5705,7 @@
         </p:nvCxnSpPr>
         <p:spPr>
           <a:xfrm rot="16200000" flipH="1">
-            <a:off x="3843230" y="3689563"/>
+            <a:off x="3827583" y="3518115"/>
             <a:ext cx="118420" cy="791013"/>
           </a:xfrm>
           <a:prstGeom prst="bentConnector2">
@@ -5883,8 +5749,8 @@
         </p:nvSpPr>
         <p:spPr>
           <a:xfrm flipV="1">
-            <a:off x="4573735" y="3880736"/>
-            <a:ext cx="2337394" cy="109371"/>
+            <a:off x="4558088" y="3709287"/>
+            <a:ext cx="2315915" cy="109371"/>
           </a:xfrm>
           <a:custGeom>
             <a:avLst/>
@@ -5971,8 +5837,8 @@
         </p:nvSpPr>
         <p:spPr>
           <a:xfrm flipV="1">
-            <a:off x="4433664" y="4268006"/>
-            <a:ext cx="2477465" cy="102321"/>
+            <a:off x="4418018" y="4096556"/>
+            <a:ext cx="2454578" cy="102321"/>
           </a:xfrm>
           <a:custGeom>
             <a:avLst/>
@@ -6047,50 +5913,6 @@
       </p:sp>
       <p:cxnSp>
         <p:nvCxnSpPr>
-          <p:cNvPr id="58" name="Elbow Connector 63">
-            <a:extLst>
-              <a:ext uri="{FF2B5EF4-FFF2-40B4-BE49-F238E27FC236}">
-                <a16:creationId xmlns:a16="http://schemas.microsoft.com/office/drawing/2014/main" id="{3CE87593-2E54-438B-A670-55ED8748E017}"/>
-              </a:ext>
-            </a:extLst>
-          </p:cNvPr>
-          <p:cNvCxnSpPr/>
-          <p:nvPr/>
-        </p:nvCxnSpPr>
-        <p:spPr>
-          <a:xfrm rot="16200000" flipH="1">
-            <a:off x="2035555" y="2796931"/>
-            <a:ext cx="1242356" cy="176400"/>
-          </a:xfrm>
-          <a:prstGeom prst="bentConnector2">
-            <a:avLst/>
-          </a:prstGeom>
-          <a:ln w="19050">
-            <a:solidFill>
-              <a:schemeClr val="accent3"/>
-            </a:solidFill>
-            <a:headEnd type="none" w="med" len="med"/>
-            <a:tailEnd type="arrow" w="med" len="med"/>
-          </a:ln>
-          <a:effectLst/>
-        </p:spPr>
-        <p:style>
-          <a:lnRef idx="1">
-            <a:schemeClr val="accent2"/>
-          </a:lnRef>
-          <a:fillRef idx="2">
-            <a:schemeClr val="accent2"/>
-          </a:fillRef>
-          <a:effectRef idx="1">
-            <a:schemeClr val="accent2"/>
-          </a:effectRef>
-          <a:fontRef idx="minor">
-            <a:schemeClr val="dk1"/>
-          </a:fontRef>
-        </p:style>
-      </p:cxnSp>
-      <p:cxnSp>
-        <p:nvCxnSpPr>
           <p:cNvPr id="59" name="Elbow Connector 63">
             <a:extLst>
               <a:ext uri="{FF2B5EF4-FFF2-40B4-BE49-F238E27FC236}">
@@ -6098,12 +5920,14 @@
               </a:ext>
             </a:extLst>
           </p:cNvPr>
-          <p:cNvCxnSpPr/>
+          <p:cNvCxnSpPr>
+            <a:cxnSpLocks/>
+          </p:cNvCxnSpPr>
           <p:nvPr/>
         </p:nvCxnSpPr>
         <p:spPr>
           <a:xfrm rot="16200000" flipH="1">
-            <a:off x="2035871" y="3182192"/>
+            <a:off x="2020224" y="3010744"/>
             <a:ext cx="1242356" cy="176400"/>
           </a:xfrm>
           <a:prstGeom prst="bentConnector2">
@@ -6147,7 +5971,7 @@
         </p:nvCxnSpPr>
         <p:spPr>
           <a:xfrm rot="5400000">
-            <a:off x="3850009" y="1706235"/>
+            <a:off x="3834362" y="1534787"/>
             <a:ext cx="1824381" cy="1843808"/>
           </a:xfrm>
           <a:prstGeom prst="bentConnector2">
@@ -6194,7 +6018,7 @@
         </p:nvCxnSpPr>
         <p:spPr>
           <a:xfrm rot="5400000">
-            <a:off x="4064199" y="2287535"/>
+            <a:off x="4048552" y="2116087"/>
             <a:ext cx="1824640" cy="1415170"/>
           </a:xfrm>
           <a:prstGeom prst="bentConnector2">
@@ -6241,7 +6065,7 @@
         </p:nvCxnSpPr>
         <p:spPr>
           <a:xfrm rot="5400000">
-            <a:off x="4594449" y="2663621"/>
+            <a:off x="4578802" y="2492173"/>
             <a:ext cx="2060961" cy="118355"/>
           </a:xfrm>
           <a:prstGeom prst="bentConnector2">
@@ -6288,7 +6112,7 @@
         </p:nvCxnSpPr>
         <p:spPr>
           <a:xfrm rot="5400000">
-            <a:off x="4594828" y="3053723"/>
+            <a:off x="4579181" y="2882275"/>
             <a:ext cx="2061480" cy="119634"/>
           </a:xfrm>
           <a:prstGeom prst="bentConnector2">
@@ -6332,7 +6156,7 @@
         </p:nvSpPr>
         <p:spPr>
           <a:xfrm>
-            <a:off x="2733432" y="4203089"/>
+            <a:off x="2717785" y="4031641"/>
             <a:ext cx="1093635" cy="236841"/>
           </a:xfrm>
           <a:prstGeom prst="rect">
@@ -6384,50 +6208,6 @@
           </a:p>
         </p:txBody>
       </p:sp>
-      <p:cxnSp>
-        <p:nvCxnSpPr>
-          <p:cNvPr id="67" name="Elbow Connector 63">
-            <a:extLst>
-              <a:ext uri="{FF2B5EF4-FFF2-40B4-BE49-F238E27FC236}">
-                <a16:creationId xmlns:a16="http://schemas.microsoft.com/office/drawing/2014/main" id="{8E3AB1C7-9A87-4CD0-AFB5-5DAFB4620002}"/>
-              </a:ext>
-            </a:extLst>
-          </p:cNvPr>
-          <p:cNvCxnSpPr/>
-          <p:nvPr/>
-        </p:nvCxnSpPr>
-        <p:spPr>
-          <a:xfrm rot="16200000" flipH="1">
-            <a:off x="2034144" y="3601510"/>
-            <a:ext cx="1242356" cy="176400"/>
-          </a:xfrm>
-          <a:prstGeom prst="bentConnector2">
-            <a:avLst/>
-          </a:prstGeom>
-          <a:ln w="19050">
-            <a:solidFill>
-              <a:schemeClr val="accent3"/>
-            </a:solidFill>
-            <a:headEnd type="none" w="med" len="med"/>
-            <a:tailEnd type="arrow" w="med" len="med"/>
-          </a:ln>
-          <a:effectLst/>
-        </p:spPr>
-        <p:style>
-          <a:lnRef idx="1">
-            <a:schemeClr val="accent2"/>
-          </a:lnRef>
-          <a:fillRef idx="2">
-            <a:schemeClr val="accent2"/>
-          </a:fillRef>
-          <a:effectRef idx="1">
-            <a:schemeClr val="accent2"/>
-          </a:effectRef>
-          <a:fontRef idx="minor">
-            <a:schemeClr val="dk1"/>
-          </a:fontRef>
-        </p:style>
-      </p:cxnSp>
       <p:sp>
         <p:nvSpPr>
           <p:cNvPr id="68" name="Rectangle 11">
@@ -6442,7 +6222,7 @@
         </p:nvSpPr>
         <p:spPr>
           <a:xfrm>
-            <a:off x="3557097" y="4477760"/>
+            <a:off x="3541450" y="4306312"/>
             <a:ext cx="1267804" cy="236841"/>
           </a:xfrm>
           <a:prstGeom prst="rect">
@@ -6511,7 +6291,7 @@
         </p:nvCxnSpPr>
         <p:spPr>
           <a:xfrm rot="16200000" flipH="1">
-            <a:off x="3345052" y="4375127"/>
+            <a:off x="3329405" y="4203679"/>
             <a:ext cx="147243" cy="276847"/>
           </a:xfrm>
           <a:prstGeom prst="bentConnector2">
@@ -6555,7 +6335,7 @@
         </p:nvSpPr>
         <p:spPr>
           <a:xfrm>
-            <a:off x="4502002" y="4747010"/>
+            <a:off x="4486355" y="4575562"/>
             <a:ext cx="1040906" cy="236841"/>
           </a:xfrm>
           <a:prstGeom prst="rect">
@@ -6623,7 +6403,7 @@
         </p:nvCxnSpPr>
         <p:spPr>
           <a:xfrm rot="16200000" flipH="1">
-            <a:off x="4311520" y="4644465"/>
+            <a:off x="4295873" y="4473017"/>
             <a:ext cx="147243" cy="276847"/>
           </a:xfrm>
           <a:prstGeom prst="bentConnector2">
@@ -6667,7 +6447,7 @@
         </p:nvSpPr>
         <p:spPr>
           <a:xfrm>
-            <a:off x="4851792" y="4648226"/>
+            <a:off x="4836145" y="4476778"/>
             <a:ext cx="2037858" cy="89403"/>
           </a:xfrm>
           <a:custGeom>
@@ -6758,12 +6538,12 @@
         </p:nvCxnSpPr>
         <p:spPr>
           <a:xfrm rot="10800000" flipV="1">
-            <a:off x="3827067" y="2496792"/>
-            <a:ext cx="1862872" cy="1824718"/>
+            <a:off x="3811421" y="2343152"/>
+            <a:ext cx="1857037" cy="1806910"/>
           </a:xfrm>
           <a:prstGeom prst="bentConnector3">
             <a:avLst>
-              <a:gd name="adj1" fmla="val 90"/>
+              <a:gd name="adj1" fmla="val 186"/>
             </a:avLst>
           </a:prstGeom>
           <a:ln w="6350">
@@ -6806,7 +6586,7 @@
         </p:nvCxnSpPr>
         <p:spPr>
           <a:xfrm rot="5400000">
-            <a:off x="4324167" y="3245791"/>
+            <a:off x="4308520" y="3074343"/>
             <a:ext cx="1861552" cy="859057"/>
           </a:xfrm>
           <a:prstGeom prst="bentConnector3">
@@ -6855,8 +6635,8 @@
         </p:nvCxnSpPr>
         <p:spPr>
           <a:xfrm rot="5400000">
-            <a:off x="4595433" y="3776522"/>
-            <a:ext cx="2036385" cy="141433"/>
+            <a:off x="4579924" y="3604937"/>
+            <a:ext cx="2036384" cy="141709"/>
           </a:xfrm>
           <a:prstGeom prst="bentConnector2">
             <a:avLst/>
@@ -6867,6 +6647,98 @@
             </a:solidFill>
             <a:headEnd type="none" w="med" len="med"/>
             <a:tailEnd type="none" w="med" len="med"/>
+          </a:ln>
+          <a:effectLst/>
+        </p:spPr>
+        <p:style>
+          <a:lnRef idx="1">
+            <a:schemeClr val="accent2"/>
+          </a:lnRef>
+          <a:fillRef idx="2">
+            <a:schemeClr val="accent2"/>
+          </a:fillRef>
+          <a:effectRef idx="1">
+            <a:schemeClr val="accent2"/>
+          </a:effectRef>
+          <a:fontRef idx="minor">
+            <a:schemeClr val="dk1"/>
+          </a:fontRef>
+        </p:style>
+      </p:cxnSp>
+      <p:cxnSp>
+        <p:nvCxnSpPr>
+          <p:cNvPr id="102" name="Elbow Connector 63">
+            <a:extLst>
+              <a:ext uri="{FF2B5EF4-FFF2-40B4-BE49-F238E27FC236}">
+                <a16:creationId xmlns:a16="http://schemas.microsoft.com/office/drawing/2014/main" id="{03D375B6-FED7-4F5D-B2A1-1CE0585CA471}"/>
+              </a:ext>
+            </a:extLst>
+          </p:cNvPr>
+          <p:cNvCxnSpPr>
+            <a:cxnSpLocks/>
+          </p:cNvCxnSpPr>
+          <p:nvPr/>
+        </p:nvCxnSpPr>
+        <p:spPr>
+          <a:xfrm rot="16200000" flipH="1">
+            <a:off x="2020224" y="3439292"/>
+            <a:ext cx="1242356" cy="176400"/>
+          </a:xfrm>
+          <a:prstGeom prst="bentConnector2">
+            <a:avLst/>
+          </a:prstGeom>
+          <a:ln w="19050">
+            <a:solidFill>
+              <a:schemeClr val="accent3"/>
+            </a:solidFill>
+            <a:headEnd type="none" w="med" len="med"/>
+            <a:tailEnd type="arrow" w="med" len="med"/>
+          </a:ln>
+          <a:effectLst/>
+        </p:spPr>
+        <p:style>
+          <a:lnRef idx="1">
+            <a:schemeClr val="accent2"/>
+          </a:lnRef>
+          <a:fillRef idx="2">
+            <a:schemeClr val="accent2"/>
+          </a:fillRef>
+          <a:effectRef idx="1">
+            <a:schemeClr val="accent2"/>
+          </a:effectRef>
+          <a:fontRef idx="minor">
+            <a:schemeClr val="dk1"/>
+          </a:fontRef>
+        </p:style>
+      </p:cxnSp>
+      <p:cxnSp>
+        <p:nvCxnSpPr>
+          <p:cNvPr id="103" name="Elbow Connector 63">
+            <a:extLst>
+              <a:ext uri="{FF2B5EF4-FFF2-40B4-BE49-F238E27FC236}">
+                <a16:creationId xmlns:a16="http://schemas.microsoft.com/office/drawing/2014/main" id="{D7A0DC46-9301-4633-BD06-7428C55BFAA8}"/>
+              </a:ext>
+            </a:extLst>
+          </p:cNvPr>
+          <p:cNvCxnSpPr>
+            <a:cxnSpLocks/>
+          </p:cNvCxnSpPr>
+          <p:nvPr/>
+        </p:nvCxnSpPr>
+        <p:spPr>
+          <a:xfrm rot="16200000" flipH="1">
+            <a:off x="2096904" y="2722333"/>
+            <a:ext cx="1091749" cy="174416"/>
+          </a:xfrm>
+          <a:prstGeom prst="bentConnector2">
+            <a:avLst/>
+          </a:prstGeom>
+          <a:ln w="19050">
+            <a:solidFill>
+              <a:schemeClr val="accent3"/>
+            </a:solidFill>
+            <a:headEnd type="none" w="med" len="med"/>
+            <a:tailEnd type="arrow" w="med" len="med"/>
           </a:ln>
           <a:effectLst/>
         </p:spPr>

</xml_diff>